<commit_message>
update fig2 (add labels of panels)
</commit_message>
<xml_diff>
--- a/manuscript/figures/figures.pptx
+++ b/manuscript/figures/figures.pptx
@@ -308,7 +308,7 @@
           <a:p>
             <a:fld id="{0ACB0EB2-4780-487C-B2C2-8D0796C04687}" type="datetimeFigureOut">
               <a:rPr lang="en-US" smtClean="0"/>
-              <a:t>3/21/2019</a:t>
+              <a:t>3/29/2019</a:t>
             </a:fld>
             <a:endParaRPr lang="en-US"/>
           </a:p>
@@ -478,7 +478,7 @@
           <a:p>
             <a:fld id="{0ACB0EB2-4780-487C-B2C2-8D0796C04687}" type="datetimeFigureOut">
               <a:rPr lang="en-US" smtClean="0"/>
-              <a:t>3/21/2019</a:t>
+              <a:t>3/29/2019</a:t>
             </a:fld>
             <a:endParaRPr lang="en-US"/>
           </a:p>
@@ -658,7 +658,7 @@
           <a:p>
             <a:fld id="{0ACB0EB2-4780-487C-B2C2-8D0796C04687}" type="datetimeFigureOut">
               <a:rPr lang="en-US" smtClean="0"/>
-              <a:t>3/21/2019</a:t>
+              <a:t>3/29/2019</a:t>
             </a:fld>
             <a:endParaRPr lang="en-US"/>
           </a:p>
@@ -828,7 +828,7 @@
           <a:p>
             <a:fld id="{0ACB0EB2-4780-487C-B2C2-8D0796C04687}" type="datetimeFigureOut">
               <a:rPr lang="en-US" smtClean="0"/>
-              <a:t>3/21/2019</a:t>
+              <a:t>3/29/2019</a:t>
             </a:fld>
             <a:endParaRPr lang="en-US"/>
           </a:p>
@@ -1074,7 +1074,7 @@
           <a:p>
             <a:fld id="{0ACB0EB2-4780-487C-B2C2-8D0796C04687}" type="datetimeFigureOut">
               <a:rPr lang="en-US" smtClean="0"/>
-              <a:t>3/21/2019</a:t>
+              <a:t>3/29/2019</a:t>
             </a:fld>
             <a:endParaRPr lang="en-US"/>
           </a:p>
@@ -1362,7 +1362,7 @@
           <a:p>
             <a:fld id="{0ACB0EB2-4780-487C-B2C2-8D0796C04687}" type="datetimeFigureOut">
               <a:rPr lang="en-US" smtClean="0"/>
-              <a:t>3/21/2019</a:t>
+              <a:t>3/29/2019</a:t>
             </a:fld>
             <a:endParaRPr lang="en-US"/>
           </a:p>
@@ -1784,7 +1784,7 @@
           <a:p>
             <a:fld id="{0ACB0EB2-4780-487C-B2C2-8D0796C04687}" type="datetimeFigureOut">
               <a:rPr lang="en-US" smtClean="0"/>
-              <a:t>3/21/2019</a:t>
+              <a:t>3/29/2019</a:t>
             </a:fld>
             <a:endParaRPr lang="en-US"/>
           </a:p>
@@ -1902,7 +1902,7 @@
           <a:p>
             <a:fld id="{0ACB0EB2-4780-487C-B2C2-8D0796C04687}" type="datetimeFigureOut">
               <a:rPr lang="en-US" smtClean="0"/>
-              <a:t>3/21/2019</a:t>
+              <a:t>3/29/2019</a:t>
             </a:fld>
             <a:endParaRPr lang="en-US"/>
           </a:p>
@@ -1997,7 +1997,7 @@
           <a:p>
             <a:fld id="{0ACB0EB2-4780-487C-B2C2-8D0796C04687}" type="datetimeFigureOut">
               <a:rPr lang="en-US" smtClean="0"/>
-              <a:t>3/21/2019</a:t>
+              <a:t>3/29/2019</a:t>
             </a:fld>
             <a:endParaRPr lang="en-US"/>
           </a:p>
@@ -2274,7 +2274,7 @@
           <a:p>
             <a:fld id="{0ACB0EB2-4780-487C-B2C2-8D0796C04687}" type="datetimeFigureOut">
               <a:rPr lang="en-US" smtClean="0"/>
-              <a:t>3/21/2019</a:t>
+              <a:t>3/29/2019</a:t>
             </a:fld>
             <a:endParaRPr lang="en-US"/>
           </a:p>
@@ -2527,7 +2527,7 @@
           <a:p>
             <a:fld id="{0ACB0EB2-4780-487C-B2C2-8D0796C04687}" type="datetimeFigureOut">
               <a:rPr lang="en-US" smtClean="0"/>
-              <a:t>3/21/2019</a:t>
+              <a:t>3/29/2019</a:t>
             </a:fld>
             <a:endParaRPr lang="en-US"/>
           </a:p>
@@ -2740,7 +2740,7 @@
           <a:p>
             <a:fld id="{0ACB0EB2-4780-487C-B2C2-8D0796C04687}" type="datetimeFigureOut">
               <a:rPr lang="en-US" smtClean="0"/>
-              <a:t>3/21/2019</a:t>
+              <a:t>3/29/2019</a:t>
             </a:fld>
             <a:endParaRPr lang="en-US"/>
           </a:p>
@@ -14904,7 +14904,7 @@
                 </a:solidFill>
                 <a:latin typeface="Calibri"/>
               </a:rPr>
-              <a:t>Original names and unambiguous URIs</a:t>
+              <a:t>c) Original names and unambiguous URIs</a:t>
             </a:r>
           </a:p>
           <a:p>
@@ -15068,7 +15068,7 @@
                 </a:solidFill>
                 <a:latin typeface="Calibri"/>
               </a:rPr>
-              <a:t>Core observation table </a:t>
+              <a:t>b) Core observation table </a:t>
             </a:r>
             <a:br>
               <a:rPr lang="en-US" sz="1050" b="1" dirty="0">
@@ -15387,7 +15387,7 @@
                 </a:solidFill>
                 <a:latin typeface="Calibri"/>
               </a:rPr>
-              <a:t>Extensions</a:t>
+              <a:t>d) Extensions</a:t>
             </a:r>
             <a:br>
               <a:rPr lang="en-US" sz="1050" b="1" dirty="0">
@@ -16025,7 +16025,7 @@
                 </a:solidFill>
                 <a:latin typeface="Calibri"/>
               </a:rPr>
-              <a:t>Species </a:t>
+              <a:t>a) Species </a:t>
             </a:r>
             <a:r>
               <a:rPr lang="en-US" sz="1200" dirty="0">

</xml_diff>